<commit_message>
Add Draft of Presentation_0729
</commit_message>
<xml_diff>
--- a/Presentation_0722_JiayuChen.pptx
+++ b/Presentation_0722_JiayuChen.pptx
@@ -251,7 +251,7 @@
       <p15:sldGuideLst xmlns:p15="http://schemas.microsoft.com/office/powerpoint/2012/main"/>
     </p:ext>
     <p:ext uri="GoogleSlidesCustomDataVersion2">
-      <go:slidesCustomData xmlns:go="http://customooxmlschemas.google.com/" xmlns:ahyp="http://schemas.microsoft.com/office/drawing/2018/hyperlinkcolor" xmlns:p15="http://schemas.microsoft.com/office/powerpoint/2012/main" xmlns:p14="http://schemas.microsoft.com/office/powerpoint/2010/main" xmlns:com="http://schemas.openxmlformats.org/drawingml/2006/compatibility" xmlns:pvml="urn:schemas-microsoft-com:office:powerpoint" xmlns:v="urn:schemas-microsoft-com:vml" xmlns:o="urn:schemas-microsoft-com:office:office" xmlns:dgm="http://schemas.openxmlformats.org/drawingml/2006/diagram" xmlns:c="http://schemas.openxmlformats.org/drawingml/2006/chart" xmlns:mv="urn:schemas-microsoft-com:mac:vml" xmlns:mc="http://schemas.openxmlformats.org/markup-compatibility/2006" xmlns="" r:id="rId31" roundtripDataSignature="AMtx7mi7AOUiGfioVPTFrFzTi+gJGDXQ/w=="/>
+      <go:slidesCustomData xmlns="" xmlns:mc="http://schemas.openxmlformats.org/markup-compatibility/2006" xmlns:mv="urn:schemas-microsoft-com:mac:vml" xmlns:c="http://schemas.openxmlformats.org/drawingml/2006/chart" xmlns:dgm="http://schemas.openxmlformats.org/drawingml/2006/diagram" xmlns:o="urn:schemas-microsoft-com:office:office" xmlns:v="urn:schemas-microsoft-com:vml" xmlns:pvml="urn:schemas-microsoft-com:office:powerpoint" xmlns:com="http://schemas.openxmlformats.org/drawingml/2006/compatibility" xmlns:p14="http://schemas.microsoft.com/office/powerpoint/2010/main" xmlns:p15="http://schemas.microsoft.com/office/powerpoint/2012/main" xmlns:ahyp="http://schemas.microsoft.com/office/drawing/2018/hyperlinkcolor" xmlns:go="http://customooxmlschemas.google.com/" r:id="rId31" roundtripDataSignature="AMtx7mi7AOUiGfioVPTFrFzTi+gJGDXQ/w=="/>
     </p:ext>
   </p:extLst>
 </p:presentation>
@@ -1896,22 +1896,6 @@
               </a:spcAft>
               <a:buNone/>
             </a:pPr>
-            <a:r>
-              <a:rPr lang="en-US" altLang="zh-CN" dirty="0"/>
-              <a:t>I do the HR estimation on Real </a:t>
-            </a:r>
-            <a:r>
-              <a:rPr lang="en-US" altLang="zh-CN" dirty="0" err="1"/>
-              <a:t>Afib</a:t>
-            </a:r>
-            <a:r>
-              <a:rPr lang="en-US" altLang="zh-CN" dirty="0"/>
-              <a:t> data. The results are listed in this table sheet. The table has 4 </a:t>
-            </a:r>
-            <a:r>
-              <a:rPr lang="en-US" altLang="zh-CN" dirty="0" err="1"/>
-              <a:t>colums</a:t>
-            </a:r>
             <a:endParaRPr lang="en-US" altLang="zh-CN" dirty="0"/>
           </a:p>
         </p:txBody>
@@ -10471,7 +10455,7 @@
         </p:nvSpPr>
         <p:spPr>
           <a:xfrm>
-            <a:off x="2838373" y="2442232"/>
+            <a:off x="2838375" y="2478808"/>
             <a:ext cx="6515249" cy="1200288"/>
           </a:xfrm>
           <a:prstGeom prst="rect">
@@ -12010,7 +11994,7 @@
         </p:blipFill>
         <p:spPr>
           <a:xfrm>
-            <a:off x="6505801" y="2305136"/>
+            <a:off x="6505801" y="2293261"/>
             <a:ext cx="5476405" cy="1478592"/>
           </a:xfrm>
           <a:prstGeom prst="rect">
@@ -12039,7 +12023,7 @@
         </p:blipFill>
         <p:spPr>
           <a:xfrm>
-            <a:off x="6505801" y="4342771"/>
+            <a:off x="6505801" y="4323364"/>
             <a:ext cx="5476405" cy="1478592"/>
           </a:xfrm>
           <a:prstGeom prst="rect">

</xml_diff>